<commit_message>
charte graphique et logo-daltonisme
</commit_message>
<xml_diff>
--- a/dossier-conception/charte-graphique.pptx
+++ b/dossier-conception/charte-graphique.pptx
@@ -200,7 +200,7 @@
           <a:p>
             <a:fld id="{F4E298C6-6A67-4E1B-8666-E0F083C72074}" type="datetimeFigureOut">
               <a:rPr lang="fr-FR" smtClean="0"/>
-              <a:t>12/04/2021</a:t>
+              <a:t>13/04/2021</a:t>
             </a:fld>
             <a:endParaRPr lang="fr-FR"/>
           </a:p>
@@ -698,7 +698,7 @@
           <a:p>
             <a:fld id="{04BFDF65-6B2B-4FE3-BD6E-056295CB0837}" type="datetimeFigureOut">
               <a:rPr lang="fr-FR" smtClean="0"/>
-              <a:t>12/04/2021</a:t>
+              <a:t>13/04/2021</a:t>
             </a:fld>
             <a:endParaRPr lang="fr-FR"/>
           </a:p>
@@ -896,7 +896,7 @@
           <a:p>
             <a:fld id="{04BFDF65-6B2B-4FE3-BD6E-056295CB0837}" type="datetimeFigureOut">
               <a:rPr lang="fr-FR" smtClean="0"/>
-              <a:t>12/04/2021</a:t>
+              <a:t>13/04/2021</a:t>
             </a:fld>
             <a:endParaRPr lang="fr-FR"/>
           </a:p>
@@ -1104,7 +1104,7 @@
           <a:p>
             <a:fld id="{04BFDF65-6B2B-4FE3-BD6E-056295CB0837}" type="datetimeFigureOut">
               <a:rPr lang="fr-FR" smtClean="0"/>
-              <a:t>12/04/2021</a:t>
+              <a:t>13/04/2021</a:t>
             </a:fld>
             <a:endParaRPr lang="fr-FR"/>
           </a:p>
@@ -1302,7 +1302,7 @@
           <a:p>
             <a:fld id="{04BFDF65-6B2B-4FE3-BD6E-056295CB0837}" type="datetimeFigureOut">
               <a:rPr lang="fr-FR" smtClean="0"/>
-              <a:t>12/04/2021</a:t>
+              <a:t>13/04/2021</a:t>
             </a:fld>
             <a:endParaRPr lang="fr-FR"/>
           </a:p>
@@ -1577,7 +1577,7 @@
           <a:p>
             <a:fld id="{04BFDF65-6B2B-4FE3-BD6E-056295CB0837}" type="datetimeFigureOut">
               <a:rPr lang="fr-FR" smtClean="0"/>
-              <a:t>12/04/2021</a:t>
+              <a:t>13/04/2021</a:t>
             </a:fld>
             <a:endParaRPr lang="fr-FR"/>
           </a:p>
@@ -1842,7 +1842,7 @@
           <a:p>
             <a:fld id="{04BFDF65-6B2B-4FE3-BD6E-056295CB0837}" type="datetimeFigureOut">
               <a:rPr lang="fr-FR" smtClean="0"/>
-              <a:t>12/04/2021</a:t>
+              <a:t>13/04/2021</a:t>
             </a:fld>
             <a:endParaRPr lang="fr-FR"/>
           </a:p>
@@ -2254,7 +2254,7 @@
           <a:p>
             <a:fld id="{04BFDF65-6B2B-4FE3-BD6E-056295CB0837}" type="datetimeFigureOut">
               <a:rPr lang="fr-FR" smtClean="0"/>
-              <a:t>12/04/2021</a:t>
+              <a:t>13/04/2021</a:t>
             </a:fld>
             <a:endParaRPr lang="fr-FR"/>
           </a:p>
@@ -2395,7 +2395,7 @@
           <a:p>
             <a:fld id="{04BFDF65-6B2B-4FE3-BD6E-056295CB0837}" type="datetimeFigureOut">
               <a:rPr lang="fr-FR" smtClean="0"/>
-              <a:t>12/04/2021</a:t>
+              <a:t>13/04/2021</a:t>
             </a:fld>
             <a:endParaRPr lang="fr-FR"/>
           </a:p>
@@ -2508,7 +2508,7 @@
           <a:p>
             <a:fld id="{04BFDF65-6B2B-4FE3-BD6E-056295CB0837}" type="datetimeFigureOut">
               <a:rPr lang="fr-FR" smtClean="0"/>
-              <a:t>12/04/2021</a:t>
+              <a:t>13/04/2021</a:t>
             </a:fld>
             <a:endParaRPr lang="fr-FR"/>
           </a:p>
@@ -2819,7 +2819,7 @@
           <a:p>
             <a:fld id="{04BFDF65-6B2B-4FE3-BD6E-056295CB0837}" type="datetimeFigureOut">
               <a:rPr lang="fr-FR" smtClean="0"/>
-              <a:t>12/04/2021</a:t>
+              <a:t>13/04/2021</a:t>
             </a:fld>
             <a:endParaRPr lang="fr-FR"/>
           </a:p>
@@ -3107,7 +3107,7 @@
           <a:p>
             <a:fld id="{04BFDF65-6B2B-4FE3-BD6E-056295CB0837}" type="datetimeFigureOut">
               <a:rPr lang="fr-FR" smtClean="0"/>
-              <a:t>12/04/2021</a:t>
+              <a:t>13/04/2021</a:t>
             </a:fld>
             <a:endParaRPr lang="fr-FR"/>
           </a:p>
@@ -3351,7 +3351,7 @@
           <a:p>
             <a:fld id="{04BFDF65-6B2B-4FE3-BD6E-056295CB0837}" type="datetimeFigureOut">
               <a:rPr lang="fr-FR" smtClean="0"/>
-              <a:t>12/04/2021</a:t>
+              <a:t>13/04/2021</a:t>
             </a:fld>
             <a:endParaRPr lang="fr-FR"/>
           </a:p>
@@ -5474,10 +5474,10 @@
       </p:sp>
       <p:pic>
         <p:nvPicPr>
-          <p:cNvPr id="6" name="Espace réservé du contenu 5">
-            <a:extLst>
-              <a:ext uri="{FF2B5EF4-FFF2-40B4-BE49-F238E27FC236}">
-                <a16:creationId xmlns:a16="http://schemas.microsoft.com/office/drawing/2014/main" id="{2B6C1949-081E-4D97-B598-42A213587A05}"/>
+          <p:cNvPr id="12" name="Espace réservé du contenu 11">
+            <a:extLst>
+              <a:ext uri="{FF2B5EF4-FFF2-40B4-BE49-F238E27FC236}">
+                <a16:creationId xmlns:a16="http://schemas.microsoft.com/office/drawing/2014/main" id="{278B0A76-3947-42C9-9D8A-4362F0FAC217}"/>
               </a:ext>
             </a:extLst>
           </p:cNvPr>
@@ -5505,9 +5505,48 @@
         </p:blipFill>
         <p:spPr>
           <a:xfrm>
-            <a:off x="3920331" y="1825625"/>
+            <a:off x="3078991" y="1915937"/>
             <a:ext cx="4351338" cy="4351338"/>
           </a:xfrm>
+        </p:spPr>
+      </p:pic>
+      <p:pic>
+        <p:nvPicPr>
+          <p:cNvPr id="5" name="Graphique 4">
+            <a:extLst>
+              <a:ext uri="{FF2B5EF4-FFF2-40B4-BE49-F238E27FC236}">
+                <a16:creationId xmlns:a16="http://schemas.microsoft.com/office/drawing/2014/main" id="{555BB90E-6C7C-45A6-A6B1-D8D6EEB25AE1}"/>
+              </a:ext>
+            </a:extLst>
+          </p:cNvPr>
+          <p:cNvPicPr>
+            <a:picLocks noChangeAspect="1"/>
+          </p:cNvPicPr>
+          <p:nvPr/>
+        </p:nvPicPr>
+        <p:blipFill>
+          <a:blip r:embed="rId4">
+            <a:extLst>
+              <a:ext uri="{28A0092B-C50C-407E-A947-70E740481C1C}">
+                <a14:useLocalDpi xmlns:a14="http://schemas.microsoft.com/office/drawing/2010/main" val="0"/>
+              </a:ext>
+              <a:ext uri="{96DAC541-7B7A-43D3-8B79-37D633B846F1}">
+                <asvg:svgBlip xmlns:asvg="http://schemas.microsoft.com/office/drawing/2016/SVG/main" r:embed="rId5"/>
+              </a:ext>
+            </a:extLst>
+          </a:blip>
+          <a:stretch>
+            <a:fillRect/>
+          </a:stretch>
+        </p:blipFill>
+        <p:spPr>
+          <a:xfrm>
+            <a:off x="8263467" y="3900312"/>
+            <a:ext cx="2878666" cy="2878666"/>
+          </a:xfrm>
+          <a:prstGeom prst="rect">
+            <a:avLst/>
+          </a:prstGeom>
         </p:spPr>
       </p:pic>
     </p:spTree>

</xml_diff>